<commit_message>
Image fix in readme
</commit_message>
<xml_diff>
--- a/docs/figs/fumagno-workflow.pptx
+++ b/docs/figs/fumagno-workflow.pptx
@@ -2,12 +2,12 @@
 <file path=ppt/presentation.xml><?xml version="1.0" encoding="utf-8"?>
 <p:presentation xmlns:a="http://schemas.openxmlformats.org/drawingml/2006/main" xmlns:r="http://schemas.openxmlformats.org/officeDocument/2006/relationships" xmlns:p="http://schemas.openxmlformats.org/presentationml/2006/main" saveSubsetFonts="1">
   <p:sldMasterIdLst>
-    <p:sldMasterId id="2147483684" r:id="rId1"/>
+    <p:sldMasterId id="2147483708" r:id="rId1"/>
   </p:sldMasterIdLst>
   <p:sldIdLst>
     <p:sldId id="256" r:id="rId2"/>
   </p:sldIdLst>
-  <p:sldSz cx="14400213" cy="4679950"/>
+  <p:sldSz cx="13320713" cy="4140200"/>
   <p:notesSz cx="6858000" cy="9144000"/>
   <p:defaultTextStyle>
     <a:defPPr>
@@ -104,6 +104,11 @@
       </a:defRPr>
     </a:lvl9pPr>
   </p:defaultTextStyle>
+  <p:extLst>
+    <p:ext uri="{EFAFB233-063F-42B5-8137-9DF3F51BA10A}">
+      <p15:sldGuideLst xmlns:p15="http://schemas.microsoft.com/office/powerpoint/2012/main"/>
+    </p:ext>
+  </p:extLst>
 </p:presentation>
 </file>
 
@@ -136,15 +141,15 @@
         </p:nvSpPr>
         <p:spPr>
           <a:xfrm>
-            <a:off x="1800027" y="765909"/>
-            <a:ext cx="10800160" cy="1629316"/>
+            <a:off x="1665089" y="677575"/>
+            <a:ext cx="9990535" cy="1441403"/>
           </a:xfrm>
         </p:spPr>
         <p:txBody>
           <a:bodyPr anchor="b"/>
           <a:lstStyle>
             <a:lvl1pPr algn="ctr">
-              <a:defRPr sz="4094"/>
+              <a:defRPr sz="3622"/>
             </a:lvl1pPr>
           </a:lstStyle>
           <a:p>
@@ -168,8 +173,8 @@
         </p:nvSpPr>
         <p:spPr>
           <a:xfrm>
-            <a:off x="1800027" y="2458058"/>
-            <a:ext cx="10800160" cy="1129904"/>
+            <a:off x="1665089" y="2174564"/>
+            <a:ext cx="9990535" cy="999590"/>
           </a:xfrm>
         </p:spPr>
         <p:txBody>
@@ -177,39 +182,39 @@
           <a:lstStyle>
             <a:lvl1pPr marL="0" indent="0" algn="ctr">
               <a:buNone/>
-              <a:defRPr sz="1638"/>
+              <a:defRPr sz="1449"/>
             </a:lvl1pPr>
-            <a:lvl2pPr marL="311993" indent="0" algn="ctr">
-              <a:buNone/>
-              <a:defRPr sz="1365"/>
+            <a:lvl2pPr marL="276012" indent="0" algn="ctr">
+              <a:buNone/>
+              <a:defRPr sz="1207"/>
             </a:lvl2pPr>
-            <a:lvl3pPr marL="623987" indent="0" algn="ctr">
-              <a:buNone/>
-              <a:defRPr sz="1228"/>
+            <a:lvl3pPr marL="552023" indent="0" algn="ctr">
+              <a:buNone/>
+              <a:defRPr sz="1087"/>
             </a:lvl3pPr>
-            <a:lvl4pPr marL="935980" indent="0" algn="ctr">
-              <a:buNone/>
-              <a:defRPr sz="1092"/>
+            <a:lvl4pPr marL="828035" indent="0" algn="ctr">
+              <a:buNone/>
+              <a:defRPr sz="966"/>
             </a:lvl4pPr>
-            <a:lvl5pPr marL="1247973" indent="0" algn="ctr">
-              <a:buNone/>
-              <a:defRPr sz="1092"/>
+            <a:lvl5pPr marL="1104047" indent="0" algn="ctr">
+              <a:buNone/>
+              <a:defRPr sz="966"/>
             </a:lvl5pPr>
-            <a:lvl6pPr marL="1559966" indent="0" algn="ctr">
-              <a:buNone/>
-              <a:defRPr sz="1092"/>
+            <a:lvl6pPr marL="1380058" indent="0" algn="ctr">
+              <a:buNone/>
+              <a:defRPr sz="966"/>
             </a:lvl6pPr>
-            <a:lvl7pPr marL="1871960" indent="0" algn="ctr">
-              <a:buNone/>
-              <a:defRPr sz="1092"/>
+            <a:lvl7pPr marL="1656070" indent="0" algn="ctr">
+              <a:buNone/>
+              <a:defRPr sz="966"/>
             </a:lvl7pPr>
-            <a:lvl8pPr marL="2183953" indent="0" algn="ctr">
-              <a:buNone/>
-              <a:defRPr sz="1092"/>
+            <a:lvl8pPr marL="1932081" indent="0" algn="ctr">
+              <a:buNone/>
+              <a:defRPr sz="966"/>
             </a:lvl8pPr>
-            <a:lvl9pPr marL="2495946" indent="0" algn="ctr">
-              <a:buNone/>
-              <a:defRPr sz="1092"/>
+            <a:lvl9pPr marL="2208093" indent="0" algn="ctr">
+              <a:buNone/>
+              <a:defRPr sz="966"/>
             </a:lvl9pPr>
           </a:lstStyle>
           <a:p>
@@ -289,7 +294,7 @@
     </p:spTree>
     <p:extLst>
       <p:ext uri="{BB962C8B-B14F-4D97-AF65-F5344CB8AC3E}">
-        <p14:creationId xmlns:p14="http://schemas.microsoft.com/office/powerpoint/2010/main" val="1032929604"/>
+        <p14:creationId xmlns:p14="http://schemas.microsoft.com/office/powerpoint/2010/main" val="1513838018"/>
       </p:ext>
     </p:extLst>
   </p:cSld>
@@ -459,7 +464,7 @@
     </p:spTree>
     <p:extLst>
       <p:ext uri="{BB962C8B-B14F-4D97-AF65-F5344CB8AC3E}">
-        <p14:creationId xmlns:p14="http://schemas.microsoft.com/office/powerpoint/2010/main" val="3108529675"/>
+        <p14:creationId xmlns:p14="http://schemas.microsoft.com/office/powerpoint/2010/main" val="2051570867"/>
       </p:ext>
     </p:extLst>
   </p:cSld>
@@ -498,8 +503,8 @@
         </p:nvSpPr>
         <p:spPr>
           <a:xfrm>
-            <a:off x="10305152" y="249164"/>
-            <a:ext cx="3105046" cy="3966041"/>
+            <a:off x="9532635" y="220427"/>
+            <a:ext cx="2872279" cy="3508628"/>
           </a:xfrm>
         </p:spPr>
         <p:txBody>
@@ -526,8 +531,8 @@
         </p:nvSpPr>
         <p:spPr>
           <a:xfrm>
-            <a:off x="990015" y="249164"/>
-            <a:ext cx="9135135" cy="3966041"/>
+            <a:off x="915799" y="220427"/>
+            <a:ext cx="8450327" cy="3508628"/>
           </a:xfrm>
         </p:spPr>
         <p:txBody>
@@ -639,7 +644,7 @@
     </p:spTree>
     <p:extLst>
       <p:ext uri="{BB962C8B-B14F-4D97-AF65-F5344CB8AC3E}">
-        <p14:creationId xmlns:p14="http://schemas.microsoft.com/office/powerpoint/2010/main" val="1718593152"/>
+        <p14:creationId xmlns:p14="http://schemas.microsoft.com/office/powerpoint/2010/main" val="265973524"/>
       </p:ext>
     </p:extLst>
   </p:cSld>
@@ -809,7 +814,7 @@
     </p:spTree>
     <p:extLst>
       <p:ext uri="{BB962C8B-B14F-4D97-AF65-F5344CB8AC3E}">
-        <p14:creationId xmlns:p14="http://schemas.microsoft.com/office/powerpoint/2010/main" val="3424226184"/>
+        <p14:creationId xmlns:p14="http://schemas.microsoft.com/office/powerpoint/2010/main" val="541575047"/>
       </p:ext>
     </p:extLst>
   </p:cSld>
@@ -848,15 +853,15 @@
         </p:nvSpPr>
         <p:spPr>
           <a:xfrm>
-            <a:off x="982514" y="1166738"/>
-            <a:ext cx="12420184" cy="1946729"/>
+            <a:off x="908861" y="1032175"/>
+            <a:ext cx="11489115" cy="1722208"/>
           </a:xfrm>
         </p:spPr>
         <p:txBody>
           <a:bodyPr anchor="b"/>
           <a:lstStyle>
             <a:lvl1pPr>
-              <a:defRPr sz="4094"/>
+              <a:defRPr sz="3622"/>
             </a:lvl1pPr>
           </a:lstStyle>
           <a:p>
@@ -880,8 +885,8 @@
         </p:nvSpPr>
         <p:spPr>
           <a:xfrm>
-            <a:off x="982514" y="3131884"/>
-            <a:ext cx="12420184" cy="1023739"/>
+            <a:off x="908861" y="2770676"/>
+            <a:ext cx="11489115" cy="905668"/>
           </a:xfrm>
         </p:spPr>
         <p:txBody>
@@ -889,7 +894,7 @@
           <a:lstStyle>
             <a:lvl1pPr marL="0" indent="0">
               <a:buNone/>
-              <a:defRPr sz="1638">
+              <a:defRPr sz="1449">
                 <a:solidFill>
                   <a:schemeClr val="tx1">
                     <a:tint val="75000"/>
@@ -897,9 +902,9 @@
                 </a:solidFill>
               </a:defRPr>
             </a:lvl1pPr>
-            <a:lvl2pPr marL="311993" indent="0">
-              <a:buNone/>
-              <a:defRPr sz="1365">
+            <a:lvl2pPr marL="276012" indent="0">
+              <a:buNone/>
+              <a:defRPr sz="1207">
                 <a:solidFill>
                   <a:schemeClr val="tx1">
                     <a:tint val="75000"/>
@@ -907,9 +912,9 @@
                 </a:solidFill>
               </a:defRPr>
             </a:lvl2pPr>
-            <a:lvl3pPr marL="623987" indent="0">
-              <a:buNone/>
-              <a:defRPr sz="1228">
+            <a:lvl3pPr marL="552023" indent="0">
+              <a:buNone/>
+              <a:defRPr sz="1087">
                 <a:solidFill>
                   <a:schemeClr val="tx1">
                     <a:tint val="75000"/>
@@ -917,9 +922,9 @@
                 </a:solidFill>
               </a:defRPr>
             </a:lvl3pPr>
-            <a:lvl4pPr marL="935980" indent="0">
-              <a:buNone/>
-              <a:defRPr sz="1092">
+            <a:lvl4pPr marL="828035" indent="0">
+              <a:buNone/>
+              <a:defRPr sz="966">
                 <a:solidFill>
                   <a:schemeClr val="tx1">
                     <a:tint val="75000"/>
@@ -927,9 +932,9 @@
                 </a:solidFill>
               </a:defRPr>
             </a:lvl4pPr>
-            <a:lvl5pPr marL="1247973" indent="0">
-              <a:buNone/>
-              <a:defRPr sz="1092">
+            <a:lvl5pPr marL="1104047" indent="0">
+              <a:buNone/>
+              <a:defRPr sz="966">
                 <a:solidFill>
                   <a:schemeClr val="tx1">
                     <a:tint val="75000"/>
@@ -937,9 +942,9 @@
                 </a:solidFill>
               </a:defRPr>
             </a:lvl5pPr>
-            <a:lvl6pPr marL="1559966" indent="0">
-              <a:buNone/>
-              <a:defRPr sz="1092">
+            <a:lvl6pPr marL="1380058" indent="0">
+              <a:buNone/>
+              <a:defRPr sz="966">
                 <a:solidFill>
                   <a:schemeClr val="tx1">
                     <a:tint val="75000"/>
@@ -947,9 +952,9 @@
                 </a:solidFill>
               </a:defRPr>
             </a:lvl6pPr>
-            <a:lvl7pPr marL="1871960" indent="0">
-              <a:buNone/>
-              <a:defRPr sz="1092">
+            <a:lvl7pPr marL="1656070" indent="0">
+              <a:buNone/>
+              <a:defRPr sz="966">
                 <a:solidFill>
                   <a:schemeClr val="tx1">
                     <a:tint val="75000"/>
@@ -957,9 +962,9 @@
                 </a:solidFill>
               </a:defRPr>
             </a:lvl7pPr>
-            <a:lvl8pPr marL="2183953" indent="0">
-              <a:buNone/>
-              <a:defRPr sz="1092">
+            <a:lvl8pPr marL="1932081" indent="0">
+              <a:buNone/>
+              <a:defRPr sz="966">
                 <a:solidFill>
                   <a:schemeClr val="tx1">
                     <a:tint val="75000"/>
@@ -967,9 +972,9 @@
                 </a:solidFill>
               </a:defRPr>
             </a:lvl8pPr>
-            <a:lvl9pPr marL="2495946" indent="0">
-              <a:buNone/>
-              <a:defRPr sz="1092">
+            <a:lvl9pPr marL="2208093" indent="0">
+              <a:buNone/>
+              <a:defRPr sz="966">
                 <a:solidFill>
                   <a:schemeClr val="tx1">
                     <a:tint val="75000"/>
@@ -1055,7 +1060,7 @@
     </p:spTree>
     <p:extLst>
       <p:ext uri="{BB962C8B-B14F-4D97-AF65-F5344CB8AC3E}">
-        <p14:creationId xmlns:p14="http://schemas.microsoft.com/office/powerpoint/2010/main" val="2367537444"/>
+        <p14:creationId xmlns:p14="http://schemas.microsoft.com/office/powerpoint/2010/main" val="2821171154"/>
       </p:ext>
     </p:extLst>
   </p:cSld>
@@ -1117,8 +1122,8 @@
         </p:nvSpPr>
         <p:spPr>
           <a:xfrm>
-            <a:off x="990014" y="1245820"/>
-            <a:ext cx="6120091" cy="2969385"/>
+            <a:off x="915799" y="1102137"/>
+            <a:ext cx="5661303" cy="2626919"/>
           </a:xfrm>
         </p:spPr>
         <p:txBody>
@@ -1174,8 +1179,8 @@
         </p:nvSpPr>
         <p:spPr>
           <a:xfrm>
-            <a:off x="7290108" y="1245820"/>
-            <a:ext cx="6120091" cy="2969385"/>
+            <a:off x="6743611" y="1102137"/>
+            <a:ext cx="5661303" cy="2626919"/>
           </a:xfrm>
         </p:spPr>
         <p:txBody>
@@ -1287,7 +1292,7 @@
     </p:spTree>
     <p:extLst>
       <p:ext uri="{BB962C8B-B14F-4D97-AF65-F5344CB8AC3E}">
-        <p14:creationId xmlns:p14="http://schemas.microsoft.com/office/powerpoint/2010/main" val="3614171777"/>
+        <p14:creationId xmlns:p14="http://schemas.microsoft.com/office/powerpoint/2010/main" val="2554932909"/>
       </p:ext>
     </p:extLst>
   </p:cSld>
@@ -1326,8 +1331,8 @@
         </p:nvSpPr>
         <p:spPr>
           <a:xfrm>
-            <a:off x="991890" y="249164"/>
-            <a:ext cx="12420184" cy="904574"/>
+            <a:off x="917534" y="220428"/>
+            <a:ext cx="11489115" cy="800247"/>
           </a:xfrm>
         </p:spPr>
         <p:txBody>
@@ -1354,8 +1359,8 @@
         </p:nvSpPr>
         <p:spPr>
           <a:xfrm>
-            <a:off x="991891" y="1147238"/>
-            <a:ext cx="6091965" cy="562244"/>
+            <a:off x="917535" y="1014924"/>
+            <a:ext cx="5635285" cy="497399"/>
           </a:xfrm>
         </p:spPr>
         <p:txBody>
@@ -1363,39 +1368,39 @@
           <a:lstStyle>
             <a:lvl1pPr marL="0" indent="0">
               <a:buNone/>
-              <a:defRPr sz="1638" b="1"/>
+              <a:defRPr sz="1449" b="1"/>
             </a:lvl1pPr>
-            <a:lvl2pPr marL="311993" indent="0">
-              <a:buNone/>
-              <a:defRPr sz="1365" b="1"/>
+            <a:lvl2pPr marL="276012" indent="0">
+              <a:buNone/>
+              <a:defRPr sz="1207" b="1"/>
             </a:lvl2pPr>
-            <a:lvl3pPr marL="623987" indent="0">
-              <a:buNone/>
-              <a:defRPr sz="1228" b="1"/>
+            <a:lvl3pPr marL="552023" indent="0">
+              <a:buNone/>
+              <a:defRPr sz="1087" b="1"/>
             </a:lvl3pPr>
-            <a:lvl4pPr marL="935980" indent="0">
-              <a:buNone/>
-              <a:defRPr sz="1092" b="1"/>
+            <a:lvl4pPr marL="828035" indent="0">
+              <a:buNone/>
+              <a:defRPr sz="966" b="1"/>
             </a:lvl4pPr>
-            <a:lvl5pPr marL="1247973" indent="0">
-              <a:buNone/>
-              <a:defRPr sz="1092" b="1"/>
+            <a:lvl5pPr marL="1104047" indent="0">
+              <a:buNone/>
+              <a:defRPr sz="966" b="1"/>
             </a:lvl5pPr>
-            <a:lvl6pPr marL="1559966" indent="0">
-              <a:buNone/>
-              <a:defRPr sz="1092" b="1"/>
+            <a:lvl6pPr marL="1380058" indent="0">
+              <a:buNone/>
+              <a:defRPr sz="966" b="1"/>
             </a:lvl6pPr>
-            <a:lvl7pPr marL="1871960" indent="0">
-              <a:buNone/>
-              <a:defRPr sz="1092" b="1"/>
+            <a:lvl7pPr marL="1656070" indent="0">
+              <a:buNone/>
+              <a:defRPr sz="966" b="1"/>
             </a:lvl7pPr>
-            <a:lvl8pPr marL="2183953" indent="0">
-              <a:buNone/>
-              <a:defRPr sz="1092" b="1"/>
+            <a:lvl8pPr marL="1932081" indent="0">
+              <a:buNone/>
+              <a:defRPr sz="966" b="1"/>
             </a:lvl8pPr>
-            <a:lvl9pPr marL="2495946" indent="0">
-              <a:buNone/>
-              <a:defRPr sz="1092" b="1"/>
+            <a:lvl9pPr marL="2208093" indent="0">
+              <a:buNone/>
+              <a:defRPr sz="966" b="1"/>
             </a:lvl9pPr>
           </a:lstStyle>
           <a:p>
@@ -1419,8 +1424,8 @@
         </p:nvSpPr>
         <p:spPr>
           <a:xfrm>
-            <a:off x="991891" y="1709482"/>
-            <a:ext cx="6091965" cy="2514390"/>
+            <a:off x="917535" y="1512323"/>
+            <a:ext cx="5635285" cy="2224399"/>
           </a:xfrm>
         </p:spPr>
         <p:txBody>
@@ -1476,8 +1481,8 @@
         </p:nvSpPr>
         <p:spPr>
           <a:xfrm>
-            <a:off x="7290108" y="1147238"/>
-            <a:ext cx="6121966" cy="562244"/>
+            <a:off x="6743611" y="1014924"/>
+            <a:ext cx="5663038" cy="497399"/>
           </a:xfrm>
         </p:spPr>
         <p:txBody>
@@ -1485,39 +1490,39 @@
           <a:lstStyle>
             <a:lvl1pPr marL="0" indent="0">
               <a:buNone/>
-              <a:defRPr sz="1638" b="1"/>
+              <a:defRPr sz="1449" b="1"/>
             </a:lvl1pPr>
-            <a:lvl2pPr marL="311993" indent="0">
-              <a:buNone/>
-              <a:defRPr sz="1365" b="1"/>
+            <a:lvl2pPr marL="276012" indent="0">
+              <a:buNone/>
+              <a:defRPr sz="1207" b="1"/>
             </a:lvl2pPr>
-            <a:lvl3pPr marL="623987" indent="0">
-              <a:buNone/>
-              <a:defRPr sz="1228" b="1"/>
+            <a:lvl3pPr marL="552023" indent="0">
+              <a:buNone/>
+              <a:defRPr sz="1087" b="1"/>
             </a:lvl3pPr>
-            <a:lvl4pPr marL="935980" indent="0">
-              <a:buNone/>
-              <a:defRPr sz="1092" b="1"/>
+            <a:lvl4pPr marL="828035" indent="0">
+              <a:buNone/>
+              <a:defRPr sz="966" b="1"/>
             </a:lvl4pPr>
-            <a:lvl5pPr marL="1247973" indent="0">
-              <a:buNone/>
-              <a:defRPr sz="1092" b="1"/>
+            <a:lvl5pPr marL="1104047" indent="0">
+              <a:buNone/>
+              <a:defRPr sz="966" b="1"/>
             </a:lvl5pPr>
-            <a:lvl6pPr marL="1559966" indent="0">
-              <a:buNone/>
-              <a:defRPr sz="1092" b="1"/>
+            <a:lvl6pPr marL="1380058" indent="0">
+              <a:buNone/>
+              <a:defRPr sz="966" b="1"/>
             </a:lvl6pPr>
-            <a:lvl7pPr marL="1871960" indent="0">
-              <a:buNone/>
-              <a:defRPr sz="1092" b="1"/>
+            <a:lvl7pPr marL="1656070" indent="0">
+              <a:buNone/>
+              <a:defRPr sz="966" b="1"/>
             </a:lvl7pPr>
-            <a:lvl8pPr marL="2183953" indent="0">
-              <a:buNone/>
-              <a:defRPr sz="1092" b="1"/>
+            <a:lvl8pPr marL="1932081" indent="0">
+              <a:buNone/>
+              <a:defRPr sz="966" b="1"/>
             </a:lvl8pPr>
-            <a:lvl9pPr marL="2495946" indent="0">
-              <a:buNone/>
-              <a:defRPr sz="1092" b="1"/>
+            <a:lvl9pPr marL="2208093" indent="0">
+              <a:buNone/>
+              <a:defRPr sz="966" b="1"/>
             </a:lvl9pPr>
           </a:lstStyle>
           <a:p>
@@ -1541,8 +1546,8 @@
         </p:nvSpPr>
         <p:spPr>
           <a:xfrm>
-            <a:off x="7290108" y="1709482"/>
-            <a:ext cx="6121966" cy="2514390"/>
+            <a:off x="6743611" y="1512323"/>
+            <a:ext cx="5663038" cy="2224399"/>
           </a:xfrm>
         </p:spPr>
         <p:txBody>
@@ -1654,7 +1659,7 @@
     </p:spTree>
     <p:extLst>
       <p:ext uri="{BB962C8B-B14F-4D97-AF65-F5344CB8AC3E}">
-        <p14:creationId xmlns:p14="http://schemas.microsoft.com/office/powerpoint/2010/main" val="856905597"/>
+        <p14:creationId xmlns:p14="http://schemas.microsoft.com/office/powerpoint/2010/main" val="3446221763"/>
       </p:ext>
     </p:extLst>
   </p:cSld>
@@ -1772,7 +1777,7 @@
     </p:spTree>
     <p:extLst>
       <p:ext uri="{BB962C8B-B14F-4D97-AF65-F5344CB8AC3E}">
-        <p14:creationId xmlns:p14="http://schemas.microsoft.com/office/powerpoint/2010/main" val="2661071275"/>
+        <p14:creationId xmlns:p14="http://schemas.microsoft.com/office/powerpoint/2010/main" val="3717168673"/>
       </p:ext>
     </p:extLst>
   </p:cSld>
@@ -1867,7 +1872,7 @@
     </p:spTree>
     <p:extLst>
       <p:ext uri="{BB962C8B-B14F-4D97-AF65-F5344CB8AC3E}">
-        <p14:creationId xmlns:p14="http://schemas.microsoft.com/office/powerpoint/2010/main" val="3922774351"/>
+        <p14:creationId xmlns:p14="http://schemas.microsoft.com/office/powerpoint/2010/main" val="3638614328"/>
       </p:ext>
     </p:extLst>
   </p:cSld>
@@ -1906,15 +1911,15 @@
         </p:nvSpPr>
         <p:spPr>
           <a:xfrm>
-            <a:off x="991891" y="311997"/>
-            <a:ext cx="4644443" cy="1091988"/>
+            <a:off x="917535" y="276013"/>
+            <a:ext cx="4296276" cy="966047"/>
           </a:xfrm>
         </p:spPr>
         <p:txBody>
           <a:bodyPr anchor="b"/>
           <a:lstStyle>
             <a:lvl1pPr>
-              <a:defRPr sz="2184"/>
+              <a:defRPr sz="1932"/>
             </a:lvl1pPr>
           </a:lstStyle>
           <a:p>
@@ -1938,39 +1943,39 @@
         </p:nvSpPr>
         <p:spPr>
           <a:xfrm>
-            <a:off x="6121966" y="673826"/>
-            <a:ext cx="7290108" cy="3325798"/>
+            <a:off x="5663038" y="596113"/>
+            <a:ext cx="6743611" cy="2942225"/>
           </a:xfrm>
         </p:spPr>
         <p:txBody>
           <a:bodyPr/>
           <a:lstStyle>
             <a:lvl1pPr>
-              <a:defRPr sz="2184"/>
+              <a:defRPr sz="1932"/>
             </a:lvl1pPr>
             <a:lvl2pPr>
-              <a:defRPr sz="1911"/>
+              <a:defRPr sz="1690"/>
             </a:lvl2pPr>
             <a:lvl3pPr>
-              <a:defRPr sz="1638"/>
+              <a:defRPr sz="1449"/>
             </a:lvl3pPr>
             <a:lvl4pPr>
-              <a:defRPr sz="1365"/>
+              <a:defRPr sz="1207"/>
             </a:lvl4pPr>
             <a:lvl5pPr>
-              <a:defRPr sz="1365"/>
+              <a:defRPr sz="1207"/>
             </a:lvl5pPr>
             <a:lvl6pPr>
-              <a:defRPr sz="1365"/>
+              <a:defRPr sz="1207"/>
             </a:lvl6pPr>
             <a:lvl7pPr>
-              <a:defRPr sz="1365"/>
+              <a:defRPr sz="1207"/>
             </a:lvl7pPr>
             <a:lvl8pPr>
-              <a:defRPr sz="1365"/>
+              <a:defRPr sz="1207"/>
             </a:lvl8pPr>
             <a:lvl9pPr>
-              <a:defRPr sz="1365"/>
+              <a:defRPr sz="1207"/>
             </a:lvl9pPr>
           </a:lstStyle>
           <a:p>
@@ -2023,8 +2028,8 @@
         </p:nvSpPr>
         <p:spPr>
           <a:xfrm>
-            <a:off x="991891" y="1403985"/>
-            <a:ext cx="4644443" cy="2601056"/>
+            <a:off x="917535" y="1242060"/>
+            <a:ext cx="4296276" cy="2301070"/>
           </a:xfrm>
         </p:spPr>
         <p:txBody>
@@ -2032,39 +2037,39 @@
           <a:lstStyle>
             <a:lvl1pPr marL="0" indent="0">
               <a:buNone/>
-              <a:defRPr sz="1092"/>
+              <a:defRPr sz="966"/>
             </a:lvl1pPr>
-            <a:lvl2pPr marL="311993" indent="0">
-              <a:buNone/>
-              <a:defRPr sz="955"/>
+            <a:lvl2pPr marL="276012" indent="0">
+              <a:buNone/>
+              <a:defRPr sz="845"/>
             </a:lvl2pPr>
-            <a:lvl3pPr marL="623987" indent="0">
-              <a:buNone/>
-              <a:defRPr sz="819"/>
+            <a:lvl3pPr marL="552023" indent="0">
+              <a:buNone/>
+              <a:defRPr sz="724"/>
             </a:lvl3pPr>
-            <a:lvl4pPr marL="935980" indent="0">
-              <a:buNone/>
-              <a:defRPr sz="682"/>
+            <a:lvl4pPr marL="828035" indent="0">
+              <a:buNone/>
+              <a:defRPr sz="604"/>
             </a:lvl4pPr>
-            <a:lvl5pPr marL="1247973" indent="0">
-              <a:buNone/>
-              <a:defRPr sz="682"/>
+            <a:lvl5pPr marL="1104047" indent="0">
+              <a:buNone/>
+              <a:defRPr sz="604"/>
             </a:lvl5pPr>
-            <a:lvl6pPr marL="1559966" indent="0">
-              <a:buNone/>
-              <a:defRPr sz="682"/>
+            <a:lvl6pPr marL="1380058" indent="0">
+              <a:buNone/>
+              <a:defRPr sz="604"/>
             </a:lvl6pPr>
-            <a:lvl7pPr marL="1871960" indent="0">
-              <a:buNone/>
-              <a:defRPr sz="682"/>
+            <a:lvl7pPr marL="1656070" indent="0">
+              <a:buNone/>
+              <a:defRPr sz="604"/>
             </a:lvl7pPr>
-            <a:lvl8pPr marL="2183953" indent="0">
-              <a:buNone/>
-              <a:defRPr sz="682"/>
+            <a:lvl8pPr marL="1932081" indent="0">
+              <a:buNone/>
+              <a:defRPr sz="604"/>
             </a:lvl8pPr>
-            <a:lvl9pPr marL="2495946" indent="0">
-              <a:buNone/>
-              <a:defRPr sz="682"/>
+            <a:lvl9pPr marL="2208093" indent="0">
+              <a:buNone/>
+              <a:defRPr sz="604"/>
             </a:lvl9pPr>
           </a:lstStyle>
           <a:p>
@@ -2144,7 +2149,7 @@
     </p:spTree>
     <p:extLst>
       <p:ext uri="{BB962C8B-B14F-4D97-AF65-F5344CB8AC3E}">
-        <p14:creationId xmlns:p14="http://schemas.microsoft.com/office/powerpoint/2010/main" val="3421906903"/>
+        <p14:creationId xmlns:p14="http://schemas.microsoft.com/office/powerpoint/2010/main" val="723080568"/>
       </p:ext>
     </p:extLst>
   </p:cSld>
@@ -2183,15 +2188,15 @@
         </p:nvSpPr>
         <p:spPr>
           <a:xfrm>
-            <a:off x="991891" y="311997"/>
-            <a:ext cx="4644443" cy="1091988"/>
+            <a:off x="917535" y="276013"/>
+            <a:ext cx="4296276" cy="966047"/>
           </a:xfrm>
         </p:spPr>
         <p:txBody>
           <a:bodyPr anchor="b"/>
           <a:lstStyle>
             <a:lvl1pPr>
-              <a:defRPr sz="2184"/>
+              <a:defRPr sz="1932"/>
             </a:lvl1pPr>
           </a:lstStyle>
           <a:p>
@@ -2215,8 +2220,8 @@
         </p:nvSpPr>
         <p:spPr>
           <a:xfrm>
-            <a:off x="6121966" y="673826"/>
-            <a:ext cx="7290108" cy="3325798"/>
+            <a:off x="5663038" y="596113"/>
+            <a:ext cx="6743611" cy="2942225"/>
           </a:xfrm>
         </p:spPr>
         <p:txBody>
@@ -2224,39 +2229,39 @@
           <a:lstStyle>
             <a:lvl1pPr marL="0" indent="0">
               <a:buNone/>
-              <a:defRPr sz="2184"/>
+              <a:defRPr sz="1932"/>
             </a:lvl1pPr>
-            <a:lvl2pPr marL="311993" indent="0">
-              <a:buNone/>
-              <a:defRPr sz="1911"/>
+            <a:lvl2pPr marL="276012" indent="0">
+              <a:buNone/>
+              <a:defRPr sz="1690"/>
             </a:lvl2pPr>
-            <a:lvl3pPr marL="623987" indent="0">
-              <a:buNone/>
-              <a:defRPr sz="1638"/>
+            <a:lvl3pPr marL="552023" indent="0">
+              <a:buNone/>
+              <a:defRPr sz="1449"/>
             </a:lvl3pPr>
-            <a:lvl4pPr marL="935980" indent="0">
-              <a:buNone/>
-              <a:defRPr sz="1365"/>
+            <a:lvl4pPr marL="828035" indent="0">
+              <a:buNone/>
+              <a:defRPr sz="1207"/>
             </a:lvl4pPr>
-            <a:lvl5pPr marL="1247973" indent="0">
-              <a:buNone/>
-              <a:defRPr sz="1365"/>
+            <a:lvl5pPr marL="1104047" indent="0">
+              <a:buNone/>
+              <a:defRPr sz="1207"/>
             </a:lvl5pPr>
-            <a:lvl6pPr marL="1559966" indent="0">
-              <a:buNone/>
-              <a:defRPr sz="1365"/>
+            <a:lvl6pPr marL="1380058" indent="0">
+              <a:buNone/>
+              <a:defRPr sz="1207"/>
             </a:lvl6pPr>
-            <a:lvl7pPr marL="1871960" indent="0">
-              <a:buNone/>
-              <a:defRPr sz="1365"/>
+            <a:lvl7pPr marL="1656070" indent="0">
+              <a:buNone/>
+              <a:defRPr sz="1207"/>
             </a:lvl7pPr>
-            <a:lvl8pPr marL="2183953" indent="0">
-              <a:buNone/>
-              <a:defRPr sz="1365"/>
+            <a:lvl8pPr marL="1932081" indent="0">
+              <a:buNone/>
+              <a:defRPr sz="1207"/>
             </a:lvl8pPr>
-            <a:lvl9pPr marL="2495946" indent="0">
-              <a:buNone/>
-              <a:defRPr sz="1365"/>
+            <a:lvl9pPr marL="2208093" indent="0">
+              <a:buNone/>
+              <a:defRPr sz="1207"/>
             </a:lvl9pPr>
           </a:lstStyle>
           <a:p>
@@ -2280,8 +2285,8 @@
         </p:nvSpPr>
         <p:spPr>
           <a:xfrm>
-            <a:off x="991891" y="1403985"/>
-            <a:ext cx="4644443" cy="2601056"/>
+            <a:off x="917535" y="1242060"/>
+            <a:ext cx="4296276" cy="2301070"/>
           </a:xfrm>
         </p:spPr>
         <p:txBody>
@@ -2289,39 +2294,39 @@
           <a:lstStyle>
             <a:lvl1pPr marL="0" indent="0">
               <a:buNone/>
-              <a:defRPr sz="1092"/>
+              <a:defRPr sz="966"/>
             </a:lvl1pPr>
-            <a:lvl2pPr marL="311993" indent="0">
-              <a:buNone/>
-              <a:defRPr sz="955"/>
+            <a:lvl2pPr marL="276012" indent="0">
+              <a:buNone/>
+              <a:defRPr sz="845"/>
             </a:lvl2pPr>
-            <a:lvl3pPr marL="623987" indent="0">
-              <a:buNone/>
-              <a:defRPr sz="819"/>
+            <a:lvl3pPr marL="552023" indent="0">
+              <a:buNone/>
+              <a:defRPr sz="724"/>
             </a:lvl3pPr>
-            <a:lvl4pPr marL="935980" indent="0">
-              <a:buNone/>
-              <a:defRPr sz="682"/>
+            <a:lvl4pPr marL="828035" indent="0">
+              <a:buNone/>
+              <a:defRPr sz="604"/>
             </a:lvl4pPr>
-            <a:lvl5pPr marL="1247973" indent="0">
-              <a:buNone/>
-              <a:defRPr sz="682"/>
+            <a:lvl5pPr marL="1104047" indent="0">
+              <a:buNone/>
+              <a:defRPr sz="604"/>
             </a:lvl5pPr>
-            <a:lvl6pPr marL="1559966" indent="0">
-              <a:buNone/>
-              <a:defRPr sz="682"/>
+            <a:lvl6pPr marL="1380058" indent="0">
+              <a:buNone/>
+              <a:defRPr sz="604"/>
             </a:lvl6pPr>
-            <a:lvl7pPr marL="1871960" indent="0">
-              <a:buNone/>
-              <a:defRPr sz="682"/>
+            <a:lvl7pPr marL="1656070" indent="0">
+              <a:buNone/>
+              <a:defRPr sz="604"/>
             </a:lvl7pPr>
-            <a:lvl8pPr marL="2183953" indent="0">
-              <a:buNone/>
-              <a:defRPr sz="682"/>
+            <a:lvl8pPr marL="1932081" indent="0">
+              <a:buNone/>
+              <a:defRPr sz="604"/>
             </a:lvl8pPr>
-            <a:lvl9pPr marL="2495946" indent="0">
-              <a:buNone/>
-              <a:defRPr sz="682"/>
+            <a:lvl9pPr marL="2208093" indent="0">
+              <a:buNone/>
+              <a:defRPr sz="604"/>
             </a:lvl9pPr>
           </a:lstStyle>
           <a:p>
@@ -2401,7 +2406,7 @@
     </p:spTree>
     <p:extLst>
       <p:ext uri="{BB962C8B-B14F-4D97-AF65-F5344CB8AC3E}">
-        <p14:creationId xmlns:p14="http://schemas.microsoft.com/office/powerpoint/2010/main" val="4027759702"/>
+        <p14:creationId xmlns:p14="http://schemas.microsoft.com/office/powerpoint/2010/main" val="1133609370"/>
       </p:ext>
     </p:extLst>
   </p:cSld>
@@ -2445,8 +2450,8 @@
         </p:nvSpPr>
         <p:spPr>
           <a:xfrm>
-            <a:off x="990015" y="249164"/>
-            <a:ext cx="12420184" cy="904574"/>
+            <a:off x="915799" y="220428"/>
+            <a:ext cx="11489115" cy="800247"/>
           </a:xfrm>
           <a:prstGeom prst="rect">
             <a:avLst/>
@@ -2478,8 +2483,8 @@
         </p:nvSpPr>
         <p:spPr>
           <a:xfrm>
-            <a:off x="990015" y="1245820"/>
-            <a:ext cx="12420184" cy="2969385"/>
+            <a:off x="915799" y="1102137"/>
+            <a:ext cx="11489115" cy="2626919"/>
           </a:xfrm>
           <a:prstGeom prst="rect">
             <a:avLst/>
@@ -2540,8 +2545,8 @@
         </p:nvSpPr>
         <p:spPr>
           <a:xfrm>
-            <a:off x="990015" y="4337621"/>
-            <a:ext cx="3240048" cy="249164"/>
+            <a:off x="915799" y="3837352"/>
+            <a:ext cx="2997160" cy="220427"/>
           </a:xfrm>
           <a:prstGeom prst="rect">
             <a:avLst/>
@@ -2551,7 +2556,7 @@
           <a:bodyPr vert="horz" lIns="91440" tIns="45720" rIns="91440" bIns="45720" rtlCol="0" anchor="ctr"/>
           <a:lstStyle>
             <a:lvl1pPr algn="l">
-              <a:defRPr sz="819">
+              <a:defRPr sz="724">
                 <a:solidFill>
                   <a:schemeClr val="tx1">
                     <a:tint val="75000"/>
@@ -2581,8 +2586,8 @@
         </p:nvSpPr>
         <p:spPr>
           <a:xfrm>
-            <a:off x="4770071" y="4337621"/>
-            <a:ext cx="4860072" cy="249164"/>
+            <a:off x="4412486" y="3837352"/>
+            <a:ext cx="4495741" cy="220427"/>
           </a:xfrm>
           <a:prstGeom prst="rect">
             <a:avLst/>
@@ -2592,7 +2597,7 @@
           <a:bodyPr vert="horz" lIns="91440" tIns="45720" rIns="91440" bIns="45720" rtlCol="0" anchor="ctr"/>
           <a:lstStyle>
             <a:lvl1pPr algn="ctr">
-              <a:defRPr sz="819">
+              <a:defRPr sz="724">
                 <a:solidFill>
                   <a:schemeClr val="tx1">
                     <a:tint val="75000"/>
@@ -2618,8 +2623,8 @@
         </p:nvSpPr>
         <p:spPr>
           <a:xfrm>
-            <a:off x="10170150" y="4337621"/>
-            <a:ext cx="3240048" cy="249164"/>
+            <a:off x="9407754" y="3837352"/>
+            <a:ext cx="2997160" cy="220427"/>
           </a:xfrm>
           <a:prstGeom prst="rect">
             <a:avLst/>
@@ -2629,7 +2634,7 @@
           <a:bodyPr vert="horz" lIns="91440" tIns="45720" rIns="91440" bIns="45720" rtlCol="0" anchor="ctr"/>
           <a:lstStyle>
             <a:lvl1pPr algn="r">
-              <a:defRPr sz="819">
+              <a:defRPr sz="724">
                 <a:solidFill>
                   <a:schemeClr val="tx1">
                     <a:tint val="75000"/>
@@ -2650,27 +2655,27 @@
     </p:spTree>
     <p:extLst>
       <p:ext uri="{BB962C8B-B14F-4D97-AF65-F5344CB8AC3E}">
-        <p14:creationId xmlns:p14="http://schemas.microsoft.com/office/powerpoint/2010/main" val="3446791073"/>
+        <p14:creationId xmlns:p14="http://schemas.microsoft.com/office/powerpoint/2010/main" val="2122328035"/>
       </p:ext>
     </p:extLst>
   </p:cSld>
   <p:clrMap bg1="lt1" tx1="dk1" bg2="lt2" tx2="dk2" accent1="accent1" accent2="accent2" accent3="accent3" accent4="accent4" accent5="accent5" accent6="accent6" hlink="hlink" folHlink="folHlink"/>
   <p:sldLayoutIdLst>
-    <p:sldLayoutId id="2147483685" r:id="rId1"/>
-    <p:sldLayoutId id="2147483686" r:id="rId2"/>
-    <p:sldLayoutId id="2147483687" r:id="rId3"/>
-    <p:sldLayoutId id="2147483688" r:id="rId4"/>
-    <p:sldLayoutId id="2147483689" r:id="rId5"/>
-    <p:sldLayoutId id="2147483690" r:id="rId6"/>
-    <p:sldLayoutId id="2147483691" r:id="rId7"/>
-    <p:sldLayoutId id="2147483692" r:id="rId8"/>
-    <p:sldLayoutId id="2147483693" r:id="rId9"/>
-    <p:sldLayoutId id="2147483694" r:id="rId10"/>
-    <p:sldLayoutId id="2147483695" r:id="rId11"/>
+    <p:sldLayoutId id="2147483709" r:id="rId1"/>
+    <p:sldLayoutId id="2147483710" r:id="rId2"/>
+    <p:sldLayoutId id="2147483711" r:id="rId3"/>
+    <p:sldLayoutId id="2147483712" r:id="rId4"/>
+    <p:sldLayoutId id="2147483713" r:id="rId5"/>
+    <p:sldLayoutId id="2147483714" r:id="rId6"/>
+    <p:sldLayoutId id="2147483715" r:id="rId7"/>
+    <p:sldLayoutId id="2147483716" r:id="rId8"/>
+    <p:sldLayoutId id="2147483717" r:id="rId9"/>
+    <p:sldLayoutId id="2147483718" r:id="rId10"/>
+    <p:sldLayoutId id="2147483719" r:id="rId11"/>
   </p:sldLayoutIdLst>
   <p:txStyles>
     <p:titleStyle>
-      <a:lvl1pPr algn="l" defTabSz="623987" rtl="0" eaLnBrk="1" latinLnBrk="0" hangingPunct="1">
+      <a:lvl1pPr algn="l" defTabSz="552023" rtl="0" eaLnBrk="1" latinLnBrk="0" hangingPunct="1">
         <a:lnSpc>
           <a:spcPct val="90000"/>
         </a:lnSpc>
@@ -2678,7 +2683,7 @@
           <a:spcPct val="0"/>
         </a:spcBef>
         <a:buNone/>
-        <a:defRPr sz="3003" kern="1200">
+        <a:defRPr sz="2656" kern="1200">
           <a:solidFill>
             <a:schemeClr val="tx1"/>
           </a:solidFill>
@@ -2689,16 +2694,16 @@
       </a:lvl1pPr>
     </p:titleStyle>
     <p:bodyStyle>
-      <a:lvl1pPr marL="155997" indent="-155997" algn="l" defTabSz="623987" rtl="0" eaLnBrk="1" latinLnBrk="0" hangingPunct="1">
+      <a:lvl1pPr marL="138006" indent="-138006" algn="l" defTabSz="552023" rtl="0" eaLnBrk="1" latinLnBrk="0" hangingPunct="1">
         <a:lnSpc>
           <a:spcPct val="90000"/>
         </a:lnSpc>
         <a:spcBef>
-          <a:spcPts val="682"/>
+          <a:spcPts val="604"/>
         </a:spcBef>
         <a:buFont typeface="Arial" panose="020B0604020202020204" pitchFamily="34" charset="0"/>
         <a:buChar char="•"/>
-        <a:defRPr sz="1911" kern="1200">
+        <a:defRPr sz="1690" kern="1200">
           <a:solidFill>
             <a:schemeClr val="tx1"/>
           </a:solidFill>
@@ -2707,16 +2712,16 @@
           <a:cs typeface="+mn-cs"/>
         </a:defRPr>
       </a:lvl1pPr>
-      <a:lvl2pPr marL="467990" indent="-155997" algn="l" defTabSz="623987" rtl="0" eaLnBrk="1" latinLnBrk="0" hangingPunct="1">
+      <a:lvl2pPr marL="414017" indent="-138006" algn="l" defTabSz="552023" rtl="0" eaLnBrk="1" latinLnBrk="0" hangingPunct="1">
         <a:lnSpc>
           <a:spcPct val="90000"/>
         </a:lnSpc>
         <a:spcBef>
-          <a:spcPts val="341"/>
+          <a:spcPts val="302"/>
         </a:spcBef>
         <a:buFont typeface="Arial" panose="020B0604020202020204" pitchFamily="34" charset="0"/>
         <a:buChar char="•"/>
-        <a:defRPr sz="1638" kern="1200">
+        <a:defRPr sz="1449" kern="1200">
           <a:solidFill>
             <a:schemeClr val="tx1"/>
           </a:solidFill>
@@ -2725,16 +2730,16 @@
           <a:cs typeface="+mn-cs"/>
         </a:defRPr>
       </a:lvl2pPr>
-      <a:lvl3pPr marL="779983" indent="-155997" algn="l" defTabSz="623987" rtl="0" eaLnBrk="1" latinLnBrk="0" hangingPunct="1">
+      <a:lvl3pPr marL="690029" indent="-138006" algn="l" defTabSz="552023" rtl="0" eaLnBrk="1" latinLnBrk="0" hangingPunct="1">
         <a:lnSpc>
           <a:spcPct val="90000"/>
         </a:lnSpc>
         <a:spcBef>
-          <a:spcPts val="341"/>
+          <a:spcPts val="302"/>
         </a:spcBef>
         <a:buFont typeface="Arial" panose="020B0604020202020204" pitchFamily="34" charset="0"/>
         <a:buChar char="•"/>
-        <a:defRPr sz="1365" kern="1200">
+        <a:defRPr sz="1207" kern="1200">
           <a:solidFill>
             <a:schemeClr val="tx1"/>
           </a:solidFill>
@@ -2743,16 +2748,16 @@
           <a:cs typeface="+mn-cs"/>
         </a:defRPr>
       </a:lvl3pPr>
-      <a:lvl4pPr marL="1091976" indent="-155997" algn="l" defTabSz="623987" rtl="0" eaLnBrk="1" latinLnBrk="0" hangingPunct="1">
+      <a:lvl4pPr marL="966041" indent="-138006" algn="l" defTabSz="552023" rtl="0" eaLnBrk="1" latinLnBrk="0" hangingPunct="1">
         <a:lnSpc>
           <a:spcPct val="90000"/>
         </a:lnSpc>
         <a:spcBef>
-          <a:spcPts val="341"/>
+          <a:spcPts val="302"/>
         </a:spcBef>
         <a:buFont typeface="Arial" panose="020B0604020202020204" pitchFamily="34" charset="0"/>
         <a:buChar char="•"/>
-        <a:defRPr sz="1228" kern="1200">
+        <a:defRPr sz="1087" kern="1200">
           <a:solidFill>
             <a:schemeClr val="tx1"/>
           </a:solidFill>
@@ -2761,16 +2766,16 @@
           <a:cs typeface="+mn-cs"/>
         </a:defRPr>
       </a:lvl4pPr>
-      <a:lvl5pPr marL="1403970" indent="-155997" algn="l" defTabSz="623987" rtl="0" eaLnBrk="1" latinLnBrk="0" hangingPunct="1">
+      <a:lvl5pPr marL="1242052" indent="-138006" algn="l" defTabSz="552023" rtl="0" eaLnBrk="1" latinLnBrk="0" hangingPunct="1">
         <a:lnSpc>
           <a:spcPct val="90000"/>
         </a:lnSpc>
         <a:spcBef>
-          <a:spcPts val="341"/>
+          <a:spcPts val="302"/>
         </a:spcBef>
         <a:buFont typeface="Arial" panose="020B0604020202020204" pitchFamily="34" charset="0"/>
         <a:buChar char="•"/>
-        <a:defRPr sz="1228" kern="1200">
+        <a:defRPr sz="1087" kern="1200">
           <a:solidFill>
             <a:schemeClr val="tx1"/>
           </a:solidFill>
@@ -2779,16 +2784,16 @@
           <a:cs typeface="+mn-cs"/>
         </a:defRPr>
       </a:lvl5pPr>
-      <a:lvl6pPr marL="1715963" indent="-155997" algn="l" defTabSz="623987" rtl="0" eaLnBrk="1" latinLnBrk="0" hangingPunct="1">
+      <a:lvl6pPr marL="1518064" indent="-138006" algn="l" defTabSz="552023" rtl="0" eaLnBrk="1" latinLnBrk="0" hangingPunct="1">
         <a:lnSpc>
           <a:spcPct val="90000"/>
         </a:lnSpc>
         <a:spcBef>
-          <a:spcPts val="341"/>
+          <a:spcPts val="302"/>
         </a:spcBef>
         <a:buFont typeface="Arial" panose="020B0604020202020204" pitchFamily="34" charset="0"/>
         <a:buChar char="•"/>
-        <a:defRPr sz="1228" kern="1200">
+        <a:defRPr sz="1087" kern="1200">
           <a:solidFill>
             <a:schemeClr val="tx1"/>
           </a:solidFill>
@@ -2797,16 +2802,16 @@
           <a:cs typeface="+mn-cs"/>
         </a:defRPr>
       </a:lvl6pPr>
-      <a:lvl7pPr marL="2027956" indent="-155997" algn="l" defTabSz="623987" rtl="0" eaLnBrk="1" latinLnBrk="0" hangingPunct="1">
+      <a:lvl7pPr marL="1794076" indent="-138006" algn="l" defTabSz="552023" rtl="0" eaLnBrk="1" latinLnBrk="0" hangingPunct="1">
         <a:lnSpc>
           <a:spcPct val="90000"/>
         </a:lnSpc>
         <a:spcBef>
-          <a:spcPts val="341"/>
+          <a:spcPts val="302"/>
         </a:spcBef>
         <a:buFont typeface="Arial" panose="020B0604020202020204" pitchFamily="34" charset="0"/>
         <a:buChar char="•"/>
-        <a:defRPr sz="1228" kern="1200">
+        <a:defRPr sz="1087" kern="1200">
           <a:solidFill>
             <a:schemeClr val="tx1"/>
           </a:solidFill>
@@ -2815,16 +2820,16 @@
           <a:cs typeface="+mn-cs"/>
         </a:defRPr>
       </a:lvl7pPr>
-      <a:lvl8pPr marL="2339950" indent="-155997" algn="l" defTabSz="623987" rtl="0" eaLnBrk="1" latinLnBrk="0" hangingPunct="1">
+      <a:lvl8pPr marL="2070087" indent="-138006" algn="l" defTabSz="552023" rtl="0" eaLnBrk="1" latinLnBrk="0" hangingPunct="1">
         <a:lnSpc>
           <a:spcPct val="90000"/>
         </a:lnSpc>
         <a:spcBef>
-          <a:spcPts val="341"/>
+          <a:spcPts val="302"/>
         </a:spcBef>
         <a:buFont typeface="Arial" panose="020B0604020202020204" pitchFamily="34" charset="0"/>
         <a:buChar char="•"/>
-        <a:defRPr sz="1228" kern="1200">
+        <a:defRPr sz="1087" kern="1200">
           <a:solidFill>
             <a:schemeClr val="tx1"/>
           </a:solidFill>
@@ -2833,16 +2838,16 @@
           <a:cs typeface="+mn-cs"/>
         </a:defRPr>
       </a:lvl8pPr>
-      <a:lvl9pPr marL="2651943" indent="-155997" algn="l" defTabSz="623987" rtl="0" eaLnBrk="1" latinLnBrk="0" hangingPunct="1">
+      <a:lvl9pPr marL="2346099" indent="-138006" algn="l" defTabSz="552023" rtl="0" eaLnBrk="1" latinLnBrk="0" hangingPunct="1">
         <a:lnSpc>
           <a:spcPct val="90000"/>
         </a:lnSpc>
         <a:spcBef>
-          <a:spcPts val="341"/>
+          <a:spcPts val="302"/>
         </a:spcBef>
         <a:buFont typeface="Arial" panose="020B0604020202020204" pitchFamily="34" charset="0"/>
         <a:buChar char="•"/>
-        <a:defRPr sz="1228" kern="1200">
+        <a:defRPr sz="1087" kern="1200">
           <a:solidFill>
             <a:schemeClr val="tx1"/>
           </a:solidFill>
@@ -2856,8 +2861,8 @@
       <a:defPPr>
         <a:defRPr lang="en-US"/>
       </a:defPPr>
-      <a:lvl1pPr marL="0" algn="l" defTabSz="623987" rtl="0" eaLnBrk="1" latinLnBrk="0" hangingPunct="1">
-        <a:defRPr sz="1228" kern="1200">
+      <a:lvl1pPr marL="0" algn="l" defTabSz="552023" rtl="0" eaLnBrk="1" latinLnBrk="0" hangingPunct="1">
+        <a:defRPr sz="1087" kern="1200">
           <a:solidFill>
             <a:schemeClr val="tx1"/>
           </a:solidFill>
@@ -2866,8 +2871,8 @@
           <a:cs typeface="+mn-cs"/>
         </a:defRPr>
       </a:lvl1pPr>
-      <a:lvl2pPr marL="311993" algn="l" defTabSz="623987" rtl="0" eaLnBrk="1" latinLnBrk="0" hangingPunct="1">
-        <a:defRPr sz="1228" kern="1200">
+      <a:lvl2pPr marL="276012" algn="l" defTabSz="552023" rtl="0" eaLnBrk="1" latinLnBrk="0" hangingPunct="1">
+        <a:defRPr sz="1087" kern="1200">
           <a:solidFill>
             <a:schemeClr val="tx1"/>
           </a:solidFill>
@@ -2876,8 +2881,8 @@
           <a:cs typeface="+mn-cs"/>
         </a:defRPr>
       </a:lvl2pPr>
-      <a:lvl3pPr marL="623987" algn="l" defTabSz="623987" rtl="0" eaLnBrk="1" latinLnBrk="0" hangingPunct="1">
-        <a:defRPr sz="1228" kern="1200">
+      <a:lvl3pPr marL="552023" algn="l" defTabSz="552023" rtl="0" eaLnBrk="1" latinLnBrk="0" hangingPunct="1">
+        <a:defRPr sz="1087" kern="1200">
           <a:solidFill>
             <a:schemeClr val="tx1"/>
           </a:solidFill>
@@ -2886,8 +2891,8 @@
           <a:cs typeface="+mn-cs"/>
         </a:defRPr>
       </a:lvl3pPr>
-      <a:lvl4pPr marL="935980" algn="l" defTabSz="623987" rtl="0" eaLnBrk="1" latinLnBrk="0" hangingPunct="1">
-        <a:defRPr sz="1228" kern="1200">
+      <a:lvl4pPr marL="828035" algn="l" defTabSz="552023" rtl="0" eaLnBrk="1" latinLnBrk="0" hangingPunct="1">
+        <a:defRPr sz="1087" kern="1200">
           <a:solidFill>
             <a:schemeClr val="tx1"/>
           </a:solidFill>
@@ -2896,8 +2901,8 @@
           <a:cs typeface="+mn-cs"/>
         </a:defRPr>
       </a:lvl4pPr>
-      <a:lvl5pPr marL="1247973" algn="l" defTabSz="623987" rtl="0" eaLnBrk="1" latinLnBrk="0" hangingPunct="1">
-        <a:defRPr sz="1228" kern="1200">
+      <a:lvl5pPr marL="1104047" algn="l" defTabSz="552023" rtl="0" eaLnBrk="1" latinLnBrk="0" hangingPunct="1">
+        <a:defRPr sz="1087" kern="1200">
           <a:solidFill>
             <a:schemeClr val="tx1"/>
           </a:solidFill>
@@ -2906,8 +2911,8 @@
           <a:cs typeface="+mn-cs"/>
         </a:defRPr>
       </a:lvl5pPr>
-      <a:lvl6pPr marL="1559966" algn="l" defTabSz="623987" rtl="0" eaLnBrk="1" latinLnBrk="0" hangingPunct="1">
-        <a:defRPr sz="1228" kern="1200">
+      <a:lvl6pPr marL="1380058" algn="l" defTabSz="552023" rtl="0" eaLnBrk="1" latinLnBrk="0" hangingPunct="1">
+        <a:defRPr sz="1087" kern="1200">
           <a:solidFill>
             <a:schemeClr val="tx1"/>
           </a:solidFill>
@@ -2916,8 +2921,8 @@
           <a:cs typeface="+mn-cs"/>
         </a:defRPr>
       </a:lvl6pPr>
-      <a:lvl7pPr marL="1871960" algn="l" defTabSz="623987" rtl="0" eaLnBrk="1" latinLnBrk="0" hangingPunct="1">
-        <a:defRPr sz="1228" kern="1200">
+      <a:lvl7pPr marL="1656070" algn="l" defTabSz="552023" rtl="0" eaLnBrk="1" latinLnBrk="0" hangingPunct="1">
+        <a:defRPr sz="1087" kern="1200">
           <a:solidFill>
             <a:schemeClr val="tx1"/>
           </a:solidFill>
@@ -2926,8 +2931,8 @@
           <a:cs typeface="+mn-cs"/>
         </a:defRPr>
       </a:lvl7pPr>
-      <a:lvl8pPr marL="2183953" algn="l" defTabSz="623987" rtl="0" eaLnBrk="1" latinLnBrk="0" hangingPunct="1">
-        <a:defRPr sz="1228" kern="1200">
+      <a:lvl8pPr marL="1932081" algn="l" defTabSz="552023" rtl="0" eaLnBrk="1" latinLnBrk="0" hangingPunct="1">
+        <a:defRPr sz="1087" kern="1200">
           <a:solidFill>
             <a:schemeClr val="tx1"/>
           </a:solidFill>
@@ -2936,8 +2941,8 @@
           <a:cs typeface="+mn-cs"/>
         </a:defRPr>
       </a:lvl8pPr>
-      <a:lvl9pPr marL="2495946" algn="l" defTabSz="623987" rtl="0" eaLnBrk="1" latinLnBrk="0" hangingPunct="1">
-        <a:defRPr sz="1228" kern="1200">
+      <a:lvl9pPr marL="2208093" algn="l" defTabSz="552023" rtl="0" eaLnBrk="1" latinLnBrk="0" hangingPunct="1">
+        <a:defRPr sz="1087" kern="1200">
           <a:solidFill>
             <a:schemeClr val="tx1"/>
           </a:solidFill>
@@ -2970,13 +2975,13 @@
       </p:grpSpPr>
       <p:sp>
         <p:nvSpPr>
-          <p:cNvPr id="4" name="Rectangle 3"/>
+          <p:cNvPr id="116" name="Rectangle 115"/>
           <p:cNvSpPr/>
           <p:nvPr/>
         </p:nvSpPr>
         <p:spPr>
           <a:xfrm>
-            <a:off x="611297" y="2538715"/>
+            <a:off x="146984" y="2512797"/>
             <a:ext cx="1758725" cy="430708"/>
           </a:xfrm>
           <a:prstGeom prst="rect">
@@ -3019,13 +3024,13 @@
       </p:sp>
       <p:sp>
         <p:nvSpPr>
-          <p:cNvPr id="5" name="Rectangle 4"/>
+          <p:cNvPr id="117" name="Rectangle 116"/>
           <p:cNvSpPr/>
           <p:nvPr/>
         </p:nvSpPr>
         <p:spPr>
           <a:xfrm>
-            <a:off x="2717023" y="1671231"/>
+            <a:off x="2252710" y="1170192"/>
             <a:ext cx="1758725" cy="430708"/>
           </a:xfrm>
           <a:prstGeom prst="rect">
@@ -3068,13 +3073,13 @@
       </p:sp>
       <p:sp>
         <p:nvSpPr>
-          <p:cNvPr id="6" name="Rectangle 5"/>
+          <p:cNvPr id="118" name="Rectangle 117"/>
           <p:cNvSpPr/>
           <p:nvPr/>
         </p:nvSpPr>
         <p:spPr>
           <a:xfrm>
-            <a:off x="7012228" y="2538715"/>
+            <a:off x="6547915" y="2512797"/>
             <a:ext cx="1758725" cy="430708"/>
           </a:xfrm>
           <a:prstGeom prst="rect">
@@ -3117,13 +3122,13 @@
       </p:sp>
       <p:sp>
         <p:nvSpPr>
-          <p:cNvPr id="7" name="Rectangle 6"/>
+          <p:cNvPr id="119" name="Rectangle 118"/>
           <p:cNvSpPr/>
           <p:nvPr/>
         </p:nvSpPr>
         <p:spPr>
           <a:xfrm>
-            <a:off x="9287315" y="2538715"/>
+            <a:off x="8823002" y="2512797"/>
             <a:ext cx="1758725" cy="430708"/>
           </a:xfrm>
           <a:prstGeom prst="rect">
@@ -3166,13 +3171,13 @@
       </p:sp>
       <p:sp>
         <p:nvSpPr>
-          <p:cNvPr id="8" name="Rectangle 7"/>
+          <p:cNvPr id="120" name="Rectangle 119"/>
           <p:cNvSpPr/>
           <p:nvPr/>
         </p:nvSpPr>
         <p:spPr>
           <a:xfrm>
-            <a:off x="11562403" y="2538715"/>
+            <a:off x="11098090" y="2512797"/>
             <a:ext cx="1758725" cy="430708"/>
           </a:xfrm>
           <a:prstGeom prst="rect">
@@ -3215,13 +3220,13 @@
       </p:sp>
       <p:sp>
         <p:nvSpPr>
-          <p:cNvPr id="9" name="Trapezoid 8"/>
+          <p:cNvPr id="121" name="Trapezoid 120"/>
           <p:cNvSpPr/>
           <p:nvPr/>
         </p:nvSpPr>
         <p:spPr>
           <a:xfrm>
-            <a:off x="1083504" y="2147481"/>
+            <a:off x="619191" y="2121563"/>
             <a:ext cx="814307" cy="316301"/>
           </a:xfrm>
           <a:prstGeom prst="trapezoid">
@@ -3264,13 +3269,13 @@
       </p:sp>
       <p:sp>
         <p:nvSpPr>
-          <p:cNvPr id="10" name="Flowchart: Internal Storage 9"/>
+          <p:cNvPr id="122" name="Flowchart: Internal Storage 121"/>
           <p:cNvSpPr/>
           <p:nvPr/>
         </p:nvSpPr>
         <p:spPr>
           <a:xfrm>
-            <a:off x="3064166" y="1190052"/>
+            <a:off x="2599853" y="689013"/>
             <a:ext cx="538386" cy="423978"/>
           </a:xfrm>
           <a:prstGeom prst="flowChartInternalStorage">
@@ -3313,13 +3318,13 @@
       </p:sp>
       <p:sp>
         <p:nvSpPr>
-          <p:cNvPr id="11" name="Flowchart: Internal Storage 10"/>
+          <p:cNvPr id="123" name="Flowchart: Internal Storage 122"/>
           <p:cNvSpPr/>
           <p:nvPr/>
         </p:nvSpPr>
         <p:spPr>
           <a:xfrm>
-            <a:off x="3637882" y="1190053"/>
+            <a:off x="3173569" y="689014"/>
             <a:ext cx="538386" cy="423978"/>
           </a:xfrm>
           <a:prstGeom prst="flowChartInternalStorage">
@@ -3362,13 +3367,13 @@
       </p:sp>
       <p:sp>
         <p:nvSpPr>
-          <p:cNvPr id="12" name="Trapezoid 11"/>
+          <p:cNvPr id="124" name="Trapezoid 123"/>
           <p:cNvSpPr/>
           <p:nvPr/>
         </p:nvSpPr>
         <p:spPr>
           <a:xfrm>
-            <a:off x="7487237" y="2142188"/>
+            <a:off x="7022924" y="2116270"/>
             <a:ext cx="814307" cy="316301"/>
           </a:xfrm>
           <a:prstGeom prst="trapezoid">
@@ -3411,13 +3416,13 @@
       </p:sp>
       <p:sp>
         <p:nvSpPr>
-          <p:cNvPr id="13" name="Rectangle 12"/>
+          <p:cNvPr id="125" name="Rectangle 124"/>
           <p:cNvSpPr/>
           <p:nvPr/>
         </p:nvSpPr>
         <p:spPr>
           <a:xfrm>
-            <a:off x="4880118" y="1671231"/>
+            <a:off x="4415805" y="1170192"/>
             <a:ext cx="1758725" cy="430708"/>
           </a:xfrm>
           <a:prstGeom prst="rect">
@@ -3460,13 +3465,13 @@
       </p:sp>
       <p:sp>
         <p:nvSpPr>
-          <p:cNvPr id="14" name="Flowchart: Internal Storage 13"/>
+          <p:cNvPr id="126" name="Flowchart: Internal Storage 125"/>
           <p:cNvSpPr/>
           <p:nvPr/>
         </p:nvSpPr>
         <p:spPr>
           <a:xfrm>
-            <a:off x="4880115" y="708872"/>
+            <a:off x="4415802" y="207833"/>
             <a:ext cx="538386" cy="423978"/>
           </a:xfrm>
           <a:prstGeom prst="flowChartInternalStorage">
@@ -3509,13 +3514,13 @@
       </p:sp>
       <p:sp>
         <p:nvSpPr>
-          <p:cNvPr id="15" name="Flowchart: Internal Storage 14"/>
+          <p:cNvPr id="127" name="Flowchart: Internal Storage 126"/>
           <p:cNvSpPr/>
           <p:nvPr/>
         </p:nvSpPr>
         <p:spPr>
           <a:xfrm>
-            <a:off x="5453831" y="705508"/>
+            <a:off x="4989518" y="204469"/>
             <a:ext cx="538386" cy="423978"/>
           </a:xfrm>
           <a:prstGeom prst="flowChartInternalStorage">
@@ -3558,13 +3563,13 @@
       </p:sp>
       <p:sp>
         <p:nvSpPr>
-          <p:cNvPr id="16" name="Flowchart: Internal Storage 15"/>
+          <p:cNvPr id="128" name="Flowchart: Internal Storage 127"/>
           <p:cNvSpPr/>
           <p:nvPr/>
         </p:nvSpPr>
         <p:spPr>
           <a:xfrm>
-            <a:off x="6027549" y="705508"/>
+            <a:off x="5563236" y="204469"/>
             <a:ext cx="538386" cy="423978"/>
           </a:xfrm>
           <a:prstGeom prst="flowChartInternalStorage">
@@ -3607,13 +3612,13 @@
       </p:sp>
       <p:sp>
         <p:nvSpPr>
-          <p:cNvPr id="17" name="Flowchart: Internal Storage 16"/>
+          <p:cNvPr id="129" name="Flowchart: Internal Storage 128"/>
           <p:cNvSpPr/>
           <p:nvPr/>
         </p:nvSpPr>
         <p:spPr>
           <a:xfrm>
-            <a:off x="5184638" y="1179958"/>
+            <a:off x="4720325" y="678919"/>
             <a:ext cx="538386" cy="423978"/>
           </a:xfrm>
           <a:prstGeom prst="flowChartInternalStorage">
@@ -3656,13 +3661,13 @@
       </p:sp>
       <p:sp>
         <p:nvSpPr>
-          <p:cNvPr id="18" name="Flowchart: Internal Storage 17"/>
+          <p:cNvPr id="130" name="Flowchart: Internal Storage 129"/>
           <p:cNvSpPr/>
           <p:nvPr/>
         </p:nvSpPr>
         <p:spPr>
           <a:xfrm>
-            <a:off x="5758354" y="1179956"/>
+            <a:off x="5294041" y="678917"/>
             <a:ext cx="538386" cy="423978"/>
           </a:xfrm>
           <a:prstGeom prst="flowChartInternalStorage">
@@ -3705,13 +3710,13 @@
       </p:sp>
       <p:sp>
         <p:nvSpPr>
-          <p:cNvPr id="19" name="Rectangle 18"/>
+          <p:cNvPr id="131" name="Rectangle 130"/>
           <p:cNvSpPr/>
           <p:nvPr/>
         </p:nvSpPr>
         <p:spPr>
           <a:xfrm>
-            <a:off x="2717023" y="3713729"/>
+            <a:off x="2252710" y="3212690"/>
             <a:ext cx="1758725" cy="430708"/>
           </a:xfrm>
           <a:prstGeom prst="rect">
@@ -3754,13 +3759,13 @@
       </p:sp>
       <p:sp>
         <p:nvSpPr>
-          <p:cNvPr id="20" name="Flowchart: Internal Storage 19"/>
+          <p:cNvPr id="132" name="Flowchart: Internal Storage 131"/>
           <p:cNvSpPr/>
           <p:nvPr/>
         </p:nvSpPr>
         <p:spPr>
           <a:xfrm>
-            <a:off x="2757399" y="3219093"/>
+            <a:off x="2293086" y="2718054"/>
             <a:ext cx="538386" cy="423978"/>
           </a:xfrm>
           <a:prstGeom prst="flowChartInternalStorage">
@@ -3803,13 +3808,13 @@
       </p:sp>
       <p:sp>
         <p:nvSpPr>
-          <p:cNvPr id="21" name="Flowchart: Internal Storage 20"/>
+          <p:cNvPr id="133" name="Flowchart: Internal Storage 132"/>
           <p:cNvSpPr/>
           <p:nvPr/>
         </p:nvSpPr>
         <p:spPr>
           <a:xfrm>
-            <a:off x="3333922" y="3219094"/>
+            <a:off x="2869609" y="2718055"/>
             <a:ext cx="538386" cy="423978"/>
           </a:xfrm>
           <a:prstGeom prst="flowChartInternalStorage">
@@ -3852,13 +3857,13 @@
       </p:sp>
       <p:sp>
         <p:nvSpPr>
-          <p:cNvPr id="22" name="Flowchart: Internal Storage 21"/>
+          <p:cNvPr id="134" name="Flowchart: Internal Storage 133"/>
           <p:cNvSpPr/>
           <p:nvPr/>
         </p:nvSpPr>
         <p:spPr>
           <a:xfrm>
-            <a:off x="3920536" y="3219093"/>
+            <a:off x="3456223" y="2718054"/>
             <a:ext cx="538386" cy="423978"/>
           </a:xfrm>
           <a:prstGeom prst="flowChartInternalStorage">
@@ -3901,13 +3906,13 @@
       </p:sp>
       <p:sp>
         <p:nvSpPr>
-          <p:cNvPr id="23" name="Rectangle 22"/>
+          <p:cNvPr id="135" name="Rectangle 134"/>
           <p:cNvSpPr/>
           <p:nvPr/>
         </p:nvSpPr>
         <p:spPr>
           <a:xfrm>
-            <a:off x="4861050" y="3713729"/>
+            <a:off x="4396737" y="3212690"/>
             <a:ext cx="1758725" cy="430708"/>
           </a:xfrm>
           <a:prstGeom prst="rect">
@@ -3950,13 +3955,13 @@
       </p:sp>
       <p:sp>
         <p:nvSpPr>
-          <p:cNvPr id="24" name="Flowchart: Internal Storage 23"/>
+          <p:cNvPr id="136" name="Flowchart: Internal Storage 135"/>
           <p:cNvSpPr/>
           <p:nvPr/>
         </p:nvSpPr>
         <p:spPr>
           <a:xfrm>
-            <a:off x="5165571" y="2764820"/>
+            <a:off x="4701258" y="2263781"/>
             <a:ext cx="538386" cy="423978"/>
           </a:xfrm>
           <a:prstGeom prst="flowChartInternalStorage">
@@ -3999,13 +4004,13 @@
       </p:sp>
       <p:sp>
         <p:nvSpPr>
-          <p:cNvPr id="25" name="Flowchart: Internal Storage 24"/>
+          <p:cNvPr id="137" name="Flowchart: Internal Storage 136"/>
           <p:cNvSpPr/>
           <p:nvPr/>
         </p:nvSpPr>
         <p:spPr>
           <a:xfrm>
-            <a:off x="5739286" y="2761456"/>
+            <a:off x="5274973" y="2260417"/>
             <a:ext cx="538386" cy="423978"/>
           </a:xfrm>
           <a:prstGeom prst="flowChartInternalStorage">
@@ -4048,13 +4053,13 @@
       </p:sp>
       <p:sp>
         <p:nvSpPr>
-          <p:cNvPr id="27" name="Flowchart: Internal Storage 26"/>
+          <p:cNvPr id="138" name="Flowchart: Internal Storage 137"/>
           <p:cNvSpPr/>
           <p:nvPr/>
         </p:nvSpPr>
         <p:spPr>
           <a:xfrm>
-            <a:off x="5165571" y="3222455"/>
+            <a:off x="4701258" y="2721416"/>
             <a:ext cx="538386" cy="423978"/>
           </a:xfrm>
           <a:prstGeom prst="flowChartInternalStorage">
@@ -4097,13 +4102,13 @@
       </p:sp>
       <p:sp>
         <p:nvSpPr>
-          <p:cNvPr id="28" name="Flowchart: Internal Storage 27"/>
+          <p:cNvPr id="139" name="Flowchart: Internal Storage 138"/>
           <p:cNvSpPr/>
           <p:nvPr/>
         </p:nvSpPr>
         <p:spPr>
           <a:xfrm>
-            <a:off x="5739286" y="3222455"/>
+            <a:off x="5274973" y="2721416"/>
             <a:ext cx="538386" cy="423978"/>
           </a:xfrm>
           <a:prstGeom prst="flowChartInternalStorage">
@@ -4146,13 +4151,13 @@
       </p:sp>
       <p:sp>
         <p:nvSpPr>
-          <p:cNvPr id="29" name="TextBox 28"/>
+          <p:cNvPr id="140" name="TextBox 139"/>
           <p:cNvSpPr txBox="1"/>
           <p:nvPr/>
         </p:nvSpPr>
         <p:spPr>
           <a:xfrm>
-            <a:off x="611297" y="2997120"/>
+            <a:off x="146984" y="2971202"/>
             <a:ext cx="1758725" cy="601511"/>
           </a:xfrm>
           <a:prstGeom prst="rect">
@@ -4176,13 +4181,13 @@
       </p:sp>
       <p:sp>
         <p:nvSpPr>
-          <p:cNvPr id="30" name="TextBox 29"/>
+          <p:cNvPr id="141" name="TextBox 140"/>
           <p:cNvSpPr txBox="1"/>
           <p:nvPr/>
         </p:nvSpPr>
         <p:spPr>
           <a:xfrm>
-            <a:off x="4861050" y="2106934"/>
+            <a:off x="4396737" y="1605895"/>
             <a:ext cx="1777793" cy="431785"/>
           </a:xfrm>
           <a:prstGeom prst="rect">
@@ -4206,13 +4211,13 @@
       </p:sp>
       <p:sp>
         <p:nvSpPr>
-          <p:cNvPr id="31" name="TextBox 30"/>
+          <p:cNvPr id="142" name="TextBox 141"/>
           <p:cNvSpPr txBox="1"/>
           <p:nvPr/>
         </p:nvSpPr>
         <p:spPr>
           <a:xfrm>
-            <a:off x="4815060" y="4151329"/>
+            <a:off x="4350747" y="3650290"/>
             <a:ext cx="1777793" cy="431785"/>
           </a:xfrm>
           <a:prstGeom prst="rect">
@@ -4236,13 +4241,13 @@
       </p:sp>
       <p:sp>
         <p:nvSpPr>
-          <p:cNvPr id="32" name="TextBox 31"/>
+          <p:cNvPr id="143" name="TextBox 142"/>
           <p:cNvSpPr txBox="1"/>
           <p:nvPr/>
         </p:nvSpPr>
         <p:spPr>
           <a:xfrm>
-            <a:off x="7010543" y="2984933"/>
+            <a:off x="6546230" y="2959015"/>
             <a:ext cx="1758725" cy="431785"/>
           </a:xfrm>
           <a:prstGeom prst="rect">
@@ -4266,13 +4271,13 @@
       </p:sp>
       <p:sp>
         <p:nvSpPr>
-          <p:cNvPr id="33" name="Arrow: Pentagon 32"/>
+          <p:cNvPr id="144" name="Arrow: Pentagon 143"/>
           <p:cNvSpPr/>
           <p:nvPr/>
         </p:nvSpPr>
         <p:spPr>
           <a:xfrm>
-            <a:off x="9147110" y="1225507"/>
+            <a:off x="8682797" y="1199589"/>
             <a:ext cx="827767" cy="380233"/>
           </a:xfrm>
           <a:prstGeom prst="homePlate">
@@ -4315,13 +4320,13 @@
       </p:sp>
       <p:sp>
         <p:nvSpPr>
-          <p:cNvPr id="34" name="Arrow: Pentagon 33"/>
+          <p:cNvPr id="145" name="Arrow: Pentagon 144"/>
           <p:cNvSpPr/>
           <p:nvPr/>
         </p:nvSpPr>
         <p:spPr>
           <a:xfrm>
-            <a:off x="9147110" y="1646010"/>
+            <a:off x="8682797" y="1620092"/>
             <a:ext cx="827767" cy="380233"/>
           </a:xfrm>
           <a:prstGeom prst="homePlate">
@@ -4364,13 +4369,13 @@
       </p:sp>
       <p:sp>
         <p:nvSpPr>
-          <p:cNvPr id="35" name="Arrow: Pentagon 34"/>
+          <p:cNvPr id="146" name="Arrow: Pentagon 145"/>
           <p:cNvSpPr/>
           <p:nvPr/>
         </p:nvSpPr>
         <p:spPr>
           <a:xfrm>
-            <a:off x="9147110" y="2066513"/>
+            <a:off x="8682797" y="2040595"/>
             <a:ext cx="827767" cy="380233"/>
           </a:xfrm>
           <a:prstGeom prst="homePlate">
@@ -4413,13 +4418,13 @@
       </p:sp>
       <p:sp>
         <p:nvSpPr>
-          <p:cNvPr id="38" name="Flowchart: Multidocument 37"/>
+          <p:cNvPr id="147" name="Flowchart: Multidocument 146"/>
           <p:cNvSpPr/>
           <p:nvPr/>
         </p:nvSpPr>
         <p:spPr>
           <a:xfrm>
-            <a:off x="10062923" y="900447"/>
+            <a:off x="9598610" y="874529"/>
             <a:ext cx="1130607" cy="731137"/>
           </a:xfrm>
           <a:prstGeom prst="flowChartMultidocument">
@@ -4458,13 +4463,13 @@
       </p:sp>
       <p:sp>
         <p:nvSpPr>
-          <p:cNvPr id="36" name="Arrow: Pentagon 35"/>
+          <p:cNvPr id="148" name="Arrow: Pentagon 147"/>
           <p:cNvSpPr/>
           <p:nvPr/>
         </p:nvSpPr>
         <p:spPr>
           <a:xfrm>
-            <a:off x="10115644" y="1071329"/>
+            <a:off x="9651331" y="1045411"/>
             <a:ext cx="827767" cy="380233"/>
           </a:xfrm>
           <a:prstGeom prst="homePlate">
@@ -4507,13 +4512,13 @@
       </p:sp>
       <p:sp>
         <p:nvSpPr>
-          <p:cNvPr id="39" name="Flowchart: Multidocument 38"/>
+          <p:cNvPr id="149" name="Flowchart: Multidocument 148"/>
           <p:cNvSpPr/>
           <p:nvPr/>
         </p:nvSpPr>
         <p:spPr>
           <a:xfrm>
-            <a:off x="10062924" y="1731690"/>
+            <a:off x="9598611" y="1705772"/>
             <a:ext cx="1130607" cy="731137"/>
           </a:xfrm>
           <a:prstGeom prst="flowChartMultidocument">
@@ -4552,13 +4557,13 @@
       </p:sp>
       <p:sp>
         <p:nvSpPr>
-          <p:cNvPr id="40" name="Arrow: Pentagon 39"/>
+          <p:cNvPr id="150" name="Arrow: Pentagon 149"/>
           <p:cNvSpPr/>
           <p:nvPr/>
         </p:nvSpPr>
         <p:spPr>
           <a:xfrm>
-            <a:off x="10115644" y="1902571"/>
+            <a:off x="9651331" y="1876653"/>
             <a:ext cx="827767" cy="380233"/>
           </a:xfrm>
           <a:prstGeom prst="homePlate">
@@ -4601,13 +4606,13 @@
       </p:sp>
       <p:sp>
         <p:nvSpPr>
-          <p:cNvPr id="41" name="TextBox 40"/>
+          <p:cNvPr id="151" name="TextBox 150"/>
           <p:cNvSpPr txBox="1"/>
           <p:nvPr/>
         </p:nvSpPr>
         <p:spPr>
           <a:xfrm>
-            <a:off x="11562403" y="2964645"/>
+            <a:off x="11098090" y="2938727"/>
             <a:ext cx="1758725" cy="262059"/>
           </a:xfrm>
           <a:prstGeom prst="rect">
@@ -4631,19 +4636,19 @@
       </p:sp>
       <p:sp>
         <p:nvSpPr>
-          <p:cNvPr id="42" name="Left Brace 41"/>
+          <p:cNvPr id="152" name="Left Brace 151"/>
           <p:cNvSpPr/>
           <p:nvPr/>
         </p:nvSpPr>
         <p:spPr>
           <a:xfrm>
-            <a:off x="2370020" y="1671231"/>
+            <a:off x="1905707" y="1170192"/>
             <a:ext cx="347000" cy="2473205"/>
           </a:xfrm>
           <a:prstGeom prst="leftBrace">
             <a:avLst>
               <a:gd name="adj1" fmla="val 54082"/>
-              <a:gd name="adj2" fmla="val 44351"/>
+              <a:gd name="adj2" fmla="val 63562"/>
             </a:avLst>
           </a:prstGeom>
         </p:spPr>
@@ -4677,19 +4682,19 @@
       </p:sp>
       <p:sp>
         <p:nvSpPr>
-          <p:cNvPr id="43" name="Right Brace 42"/>
+          <p:cNvPr id="153" name="Right Brace 152"/>
           <p:cNvSpPr/>
           <p:nvPr/>
         </p:nvSpPr>
         <p:spPr>
           <a:xfrm>
-            <a:off x="6638842" y="1666241"/>
+            <a:off x="6174529" y="1165202"/>
             <a:ext cx="354317" cy="2478196"/>
           </a:xfrm>
           <a:prstGeom prst="rightBrace">
             <a:avLst>
               <a:gd name="adj1" fmla="val 40592"/>
-              <a:gd name="adj2" fmla="val 44107"/>
+              <a:gd name="adj2" fmla="val 63279"/>
             </a:avLst>
           </a:prstGeom>
         </p:spPr>
@@ -4723,13 +4728,13 @@
       </p:sp>
       <p:sp>
         <p:nvSpPr>
-          <p:cNvPr id="44" name="Arrow: Right 43"/>
+          <p:cNvPr id="154" name="Arrow: Right 153"/>
           <p:cNvSpPr/>
           <p:nvPr/>
         </p:nvSpPr>
         <p:spPr>
           <a:xfrm>
-            <a:off x="8920226" y="2669054"/>
+            <a:off x="8455913" y="2643136"/>
             <a:ext cx="226883" cy="190500"/>
           </a:xfrm>
           <a:prstGeom prst="rightArrow">
@@ -4768,13 +4773,13 @@
       </p:sp>
       <p:sp>
         <p:nvSpPr>
-          <p:cNvPr id="45" name="Arrow: Right 44"/>
+          <p:cNvPr id="155" name="Arrow: Right 154"/>
           <p:cNvSpPr/>
           <p:nvPr/>
         </p:nvSpPr>
         <p:spPr>
           <a:xfrm>
-            <a:off x="11193530" y="2658819"/>
+            <a:off x="10729217" y="2632901"/>
             <a:ext cx="226883" cy="190500"/>
           </a:xfrm>
           <a:prstGeom prst="rightArrow">
@@ -4813,13 +4818,13 @@
       </p:sp>
       <p:sp>
         <p:nvSpPr>
-          <p:cNvPr id="46" name="Arrow: Right 45"/>
+          <p:cNvPr id="156" name="Arrow: Right 155"/>
           <p:cNvSpPr/>
           <p:nvPr/>
         </p:nvSpPr>
         <p:spPr>
           <a:xfrm>
-            <a:off x="4547879" y="1782516"/>
+            <a:off x="4083566" y="1281477"/>
             <a:ext cx="226883" cy="190500"/>
           </a:xfrm>
           <a:prstGeom prst="rightArrow">
@@ -4858,13 +4863,13 @@
       </p:sp>
       <p:sp>
         <p:nvSpPr>
-          <p:cNvPr id="47" name="Arrow: Right 46"/>
+          <p:cNvPr id="157" name="Arrow: Right 156"/>
           <p:cNvSpPr/>
           <p:nvPr/>
         </p:nvSpPr>
         <p:spPr>
           <a:xfrm>
-            <a:off x="4547879" y="3833833"/>
+            <a:off x="4083566" y="3332794"/>
             <a:ext cx="226883" cy="190500"/>
           </a:xfrm>
           <a:prstGeom prst="rightArrow">
@@ -4903,13 +4908,13 @@
       </p:sp>
       <p:sp>
         <p:nvSpPr>
-          <p:cNvPr id="48" name="Flowchart: Internal Storage 47"/>
+          <p:cNvPr id="158" name="Flowchart: Internal Storage 157"/>
           <p:cNvSpPr/>
           <p:nvPr/>
         </p:nvSpPr>
         <p:spPr>
           <a:xfrm>
-            <a:off x="11395702" y="131426"/>
+            <a:off x="10931389" y="105508"/>
             <a:ext cx="538386" cy="423978"/>
           </a:xfrm>
           <a:prstGeom prst="flowChartInternalStorage">
@@ -4952,13 +4957,13 @@
       </p:sp>
       <p:sp>
         <p:nvSpPr>
-          <p:cNvPr id="49" name="Flowchart: Internal Storage 48"/>
+          <p:cNvPr id="159" name="Flowchart: Internal Storage 158"/>
           <p:cNvSpPr/>
           <p:nvPr/>
         </p:nvSpPr>
         <p:spPr>
           <a:xfrm>
-            <a:off x="11395702" y="1089798"/>
+            <a:off x="10931389" y="1063880"/>
             <a:ext cx="538386" cy="423978"/>
           </a:xfrm>
           <a:prstGeom prst="flowChartInternalStorage">
@@ -5001,13 +5006,13 @@
       </p:sp>
       <p:sp>
         <p:nvSpPr>
-          <p:cNvPr id="50" name="Flowchart: Internal Storage 49"/>
+          <p:cNvPr id="160" name="Flowchart: Internal Storage 159"/>
           <p:cNvSpPr/>
           <p:nvPr/>
         </p:nvSpPr>
         <p:spPr>
           <a:xfrm>
-            <a:off x="11395702" y="610611"/>
+            <a:off x="10931389" y="584693"/>
             <a:ext cx="538386" cy="423978"/>
           </a:xfrm>
           <a:prstGeom prst="flowChartInternalStorage">
@@ -5050,13 +5055,13 @@
       </p:sp>
       <p:sp>
         <p:nvSpPr>
-          <p:cNvPr id="51" name="Flowchart: Internal Storage 50"/>
+          <p:cNvPr id="161" name="Flowchart: Internal Storage 160"/>
           <p:cNvSpPr/>
           <p:nvPr/>
         </p:nvSpPr>
         <p:spPr>
           <a:xfrm>
-            <a:off x="11395702" y="1568983"/>
+            <a:off x="10931389" y="1543065"/>
             <a:ext cx="538386" cy="423978"/>
           </a:xfrm>
           <a:prstGeom prst="flowChartInternalStorage">
@@ -5099,13 +5104,13 @@
       </p:sp>
       <p:sp>
         <p:nvSpPr>
-          <p:cNvPr id="52" name="Flowchart: Internal Storage 51"/>
+          <p:cNvPr id="162" name="Flowchart: Internal Storage 161"/>
           <p:cNvSpPr/>
           <p:nvPr/>
         </p:nvSpPr>
         <p:spPr>
           <a:xfrm>
-            <a:off x="11395702" y="2048168"/>
+            <a:off x="10931389" y="2022250"/>
             <a:ext cx="538386" cy="423978"/>
           </a:xfrm>
           <a:prstGeom prst="flowChartInternalStorage">
@@ -5148,13 +5153,13 @@
       </p:sp>
       <p:sp>
         <p:nvSpPr>
-          <p:cNvPr id="53" name="Flowchart: Multidocument 52"/>
+          <p:cNvPr id="163" name="Flowchart: Multidocument 162"/>
           <p:cNvSpPr/>
           <p:nvPr/>
         </p:nvSpPr>
         <p:spPr>
           <a:xfrm>
-            <a:off x="11995490" y="882430"/>
+            <a:off x="11531177" y="856512"/>
             <a:ext cx="783772" cy="766639"/>
           </a:xfrm>
           <a:prstGeom prst="flowChartMultidocument">
@@ -5193,13 +5198,13 @@
       </p:sp>
       <p:sp>
         <p:nvSpPr>
-          <p:cNvPr id="54" name="Flowchart: Internal Storage 53"/>
+          <p:cNvPr id="164" name="Flowchart: Internal Storage 163"/>
           <p:cNvSpPr/>
           <p:nvPr/>
         </p:nvSpPr>
         <p:spPr>
           <a:xfrm>
-            <a:off x="12046697" y="1063305"/>
+            <a:off x="11582384" y="1037387"/>
             <a:ext cx="538386" cy="423978"/>
           </a:xfrm>
           <a:prstGeom prst="flowChartInternalStorage">
@@ -5242,13 +5247,13 @@
       </p:sp>
       <p:sp>
         <p:nvSpPr>
-          <p:cNvPr id="55" name="Flowchart: Multidocument 54"/>
+          <p:cNvPr id="165" name="Flowchart: Multidocument 164"/>
           <p:cNvSpPr/>
           <p:nvPr/>
         </p:nvSpPr>
         <p:spPr>
           <a:xfrm>
-            <a:off x="11995490" y="1705509"/>
+            <a:off x="11531177" y="1679591"/>
             <a:ext cx="783772" cy="766639"/>
           </a:xfrm>
           <a:prstGeom prst="flowChartMultidocument">
@@ -5287,13 +5292,13 @@
       </p:sp>
       <p:sp>
         <p:nvSpPr>
-          <p:cNvPr id="56" name="Flowchart: Internal Storage 55"/>
+          <p:cNvPr id="166" name="Flowchart: Internal Storage 165"/>
           <p:cNvSpPr/>
           <p:nvPr/>
         </p:nvSpPr>
         <p:spPr>
           <a:xfrm>
-            <a:off x="12046697" y="1886385"/>
+            <a:off x="11582384" y="1860467"/>
             <a:ext cx="538386" cy="423978"/>
           </a:xfrm>
           <a:prstGeom prst="flowChartInternalStorage">
@@ -5336,13 +5341,13 @@
       </p:sp>
       <p:sp>
         <p:nvSpPr>
-          <p:cNvPr id="57" name="Flowchart: Multidocument 56"/>
+          <p:cNvPr id="167" name="Flowchart: Multidocument 166"/>
           <p:cNvSpPr/>
           <p:nvPr/>
         </p:nvSpPr>
         <p:spPr>
           <a:xfrm>
-            <a:off x="12849929" y="869480"/>
+            <a:off x="12385616" y="843562"/>
             <a:ext cx="783772" cy="766639"/>
           </a:xfrm>
           <a:prstGeom prst="flowChartMultidocument">
@@ -5381,13 +5386,13 @@
       </p:sp>
       <p:sp>
         <p:nvSpPr>
-          <p:cNvPr id="58" name="Flowchart: Internal Storage 57"/>
+          <p:cNvPr id="168" name="Flowchart: Internal Storage 167"/>
           <p:cNvSpPr/>
           <p:nvPr/>
         </p:nvSpPr>
         <p:spPr>
           <a:xfrm>
-            <a:off x="12901135" y="1050355"/>
+            <a:off x="12436822" y="1024437"/>
             <a:ext cx="538386" cy="423978"/>
           </a:xfrm>
           <a:prstGeom prst="flowChartInternalStorage">
@@ -5430,13 +5435,13 @@
       </p:sp>
       <p:sp>
         <p:nvSpPr>
-          <p:cNvPr id="59" name="Flowchart: Multidocument 58"/>
+          <p:cNvPr id="169" name="Flowchart: Multidocument 168"/>
           <p:cNvSpPr/>
           <p:nvPr/>
         </p:nvSpPr>
         <p:spPr>
           <a:xfrm>
-            <a:off x="12849929" y="1723981"/>
+            <a:off x="12385616" y="1698063"/>
             <a:ext cx="783772" cy="766639"/>
           </a:xfrm>
           <a:prstGeom prst="flowChartMultidocument">
@@ -5475,13 +5480,13 @@
       </p:sp>
       <p:sp>
         <p:nvSpPr>
-          <p:cNvPr id="60" name="Flowchart: Internal Storage 59"/>
+          <p:cNvPr id="170" name="Flowchart: Internal Storage 169"/>
           <p:cNvSpPr/>
           <p:nvPr/>
         </p:nvSpPr>
         <p:spPr>
           <a:xfrm>
-            <a:off x="12901135" y="1904856"/>
+            <a:off x="12436822" y="1878938"/>
             <a:ext cx="538386" cy="423978"/>
           </a:xfrm>
           <a:prstGeom prst="flowChartInternalStorage">

</xml_diff>

<commit_message>
readme and license changes
In preparation for making the repository public
</commit_message>
<xml_diff>
--- a/docs/figs/fumagno-workflow.pptx
+++ b/docs/figs/fumagno-workflow.pptx
@@ -243,7 +243,7 @@
           <a:p>
             <a:fld id="{92073623-3182-4ACD-ABC7-75EA36FD4C7E}" type="datetimeFigureOut">
               <a:rPr lang="es-ES" smtClean="0"/>
-              <a:t>2017-03-26</a:t>
+              <a:t>2017-04-10</a:t>
             </a:fld>
             <a:endParaRPr lang="es-ES"/>
           </a:p>
@@ -413,7 +413,7 @@
           <a:p>
             <a:fld id="{92073623-3182-4ACD-ABC7-75EA36FD4C7E}" type="datetimeFigureOut">
               <a:rPr lang="es-ES" smtClean="0"/>
-              <a:t>2017-03-26</a:t>
+              <a:t>2017-04-10</a:t>
             </a:fld>
             <a:endParaRPr lang="es-ES"/>
           </a:p>
@@ -593,7 +593,7 @@
           <a:p>
             <a:fld id="{92073623-3182-4ACD-ABC7-75EA36FD4C7E}" type="datetimeFigureOut">
               <a:rPr lang="es-ES" smtClean="0"/>
-              <a:t>2017-03-26</a:t>
+              <a:t>2017-04-10</a:t>
             </a:fld>
             <a:endParaRPr lang="es-ES"/>
           </a:p>
@@ -763,7 +763,7 @@
           <a:p>
             <a:fld id="{92073623-3182-4ACD-ABC7-75EA36FD4C7E}" type="datetimeFigureOut">
               <a:rPr lang="es-ES" smtClean="0"/>
-              <a:t>2017-03-26</a:t>
+              <a:t>2017-04-10</a:t>
             </a:fld>
             <a:endParaRPr lang="es-ES"/>
           </a:p>
@@ -1009,7 +1009,7 @@
           <a:p>
             <a:fld id="{92073623-3182-4ACD-ABC7-75EA36FD4C7E}" type="datetimeFigureOut">
               <a:rPr lang="es-ES" smtClean="0"/>
-              <a:t>2017-03-26</a:t>
+              <a:t>2017-04-10</a:t>
             </a:fld>
             <a:endParaRPr lang="es-ES"/>
           </a:p>
@@ -1241,7 +1241,7 @@
           <a:p>
             <a:fld id="{92073623-3182-4ACD-ABC7-75EA36FD4C7E}" type="datetimeFigureOut">
               <a:rPr lang="es-ES" smtClean="0"/>
-              <a:t>2017-03-26</a:t>
+              <a:t>2017-04-10</a:t>
             </a:fld>
             <a:endParaRPr lang="es-ES"/>
           </a:p>
@@ -1608,7 +1608,7 @@
           <a:p>
             <a:fld id="{92073623-3182-4ACD-ABC7-75EA36FD4C7E}" type="datetimeFigureOut">
               <a:rPr lang="es-ES" smtClean="0"/>
-              <a:t>2017-03-26</a:t>
+              <a:t>2017-04-10</a:t>
             </a:fld>
             <a:endParaRPr lang="es-ES"/>
           </a:p>
@@ -1726,7 +1726,7 @@
           <a:p>
             <a:fld id="{92073623-3182-4ACD-ABC7-75EA36FD4C7E}" type="datetimeFigureOut">
               <a:rPr lang="es-ES" smtClean="0"/>
-              <a:t>2017-03-26</a:t>
+              <a:t>2017-04-10</a:t>
             </a:fld>
             <a:endParaRPr lang="es-ES"/>
           </a:p>
@@ -1821,7 +1821,7 @@
           <a:p>
             <a:fld id="{92073623-3182-4ACD-ABC7-75EA36FD4C7E}" type="datetimeFigureOut">
               <a:rPr lang="es-ES" smtClean="0"/>
-              <a:t>2017-03-26</a:t>
+              <a:t>2017-04-10</a:t>
             </a:fld>
             <a:endParaRPr lang="es-ES"/>
           </a:p>
@@ -2098,7 +2098,7 @@
           <a:p>
             <a:fld id="{92073623-3182-4ACD-ABC7-75EA36FD4C7E}" type="datetimeFigureOut">
               <a:rPr lang="es-ES" smtClean="0"/>
-              <a:t>2017-03-26</a:t>
+              <a:t>2017-04-10</a:t>
             </a:fld>
             <a:endParaRPr lang="es-ES"/>
           </a:p>
@@ -2355,7 +2355,7 @@
           <a:p>
             <a:fld id="{92073623-3182-4ACD-ABC7-75EA36FD4C7E}" type="datetimeFigureOut">
               <a:rPr lang="es-ES" smtClean="0"/>
-              <a:t>2017-03-26</a:t>
+              <a:t>2017-04-10</a:t>
             </a:fld>
             <a:endParaRPr lang="es-ES"/>
           </a:p>
@@ -2568,7 +2568,7 @@
           <a:p>
             <a:fld id="{92073623-3182-4ACD-ABC7-75EA36FD4C7E}" type="datetimeFigureOut">
               <a:rPr lang="es-ES" smtClean="0"/>
-              <a:t>2017-03-26</a:t>
+              <a:t>2017-04-10</a:t>
             </a:fld>
             <a:endParaRPr lang="es-ES"/>
           </a:p>
@@ -4188,7 +4188,7 @@
         <p:spPr>
           <a:xfrm>
             <a:off x="4396737" y="1605895"/>
-            <a:ext cx="1777793" cy="431785"/>
+            <a:ext cx="1777793" cy="601511"/>
           </a:xfrm>
           <a:prstGeom prst="rect">
             <a:avLst/>
@@ -4203,7 +4203,7 @@
           <a:p>
             <a:r>
               <a:rPr lang="en-US" sz="1103"/>
-              <a:t>Use x0y0_direct to solve magnetic field streamlines</a:t>
+              <a:t>Use x0y0_direct or x0y0_to_plane to solve magnetic field streamlines</a:t>
             </a:r>
             <a:endParaRPr lang="es-ES" sz="1103"/>
           </a:p>

</xml_diff>